<commit_message>
Fixed errors in SapphireInternal.md and added DMList.md
</commit_message>
<xml_diff>
--- a/docs/images/SapphireOverview.pptx
+++ b/docs/images/SapphireOverview.pptx
@@ -236,9 +236,9 @@
           <a:bodyPr/>
           <a:lstStyle/>
           <a:p>
-            <a:fld id="{5BE2238D-E45F-2D46-BC69-38133F83DDFF}" type="datetimeFigureOut">
-              <a:rPr lang="en-US" smtClean="0"/>
-              <a:t>12/20/17</a:t>
+            <a:fld id="{BCB45ABD-EF6E-524E-9C46-34C28651C21A}" type="datetimeFigureOut">
+              <a:rPr lang="en-US" smtClean="0"/>
+              <a:t>12/27/17</a:t>
             </a:fld>
             <a:endParaRPr lang="en-US"/>
           </a:p>
@@ -278,7 +278,7 @@
           <a:bodyPr/>
           <a:lstStyle/>
           <a:p>
-            <a:fld id="{12354248-C45D-A849-AA63-3EEE341C7D0E}" type="slidenum">
+            <a:fld id="{251073CA-BA70-3E49-848B-50CFF95855C9}" type="slidenum">
               <a:rPr lang="en-US" smtClean="0"/>
               <a:t>‹#›</a:t>
             </a:fld>
@@ -289,7 +289,7 @@
     </p:spTree>
     <p:extLst>
       <p:ext uri="{BB962C8B-B14F-4D97-AF65-F5344CB8AC3E}">
-        <p14:creationId xmlns:p14="http://schemas.microsoft.com/office/powerpoint/2010/main" val="597074508"/>
+        <p14:creationId xmlns:p14="http://schemas.microsoft.com/office/powerpoint/2010/main" val="296257175"/>
       </p:ext>
     </p:extLst>
   </p:cSld>
@@ -406,9 +406,9 @@
           <a:bodyPr/>
           <a:lstStyle/>
           <a:p>
-            <a:fld id="{5BE2238D-E45F-2D46-BC69-38133F83DDFF}" type="datetimeFigureOut">
-              <a:rPr lang="en-US" smtClean="0"/>
-              <a:t>12/20/17</a:t>
+            <a:fld id="{BCB45ABD-EF6E-524E-9C46-34C28651C21A}" type="datetimeFigureOut">
+              <a:rPr lang="en-US" smtClean="0"/>
+              <a:t>12/27/17</a:t>
             </a:fld>
             <a:endParaRPr lang="en-US"/>
           </a:p>
@@ -448,7 +448,7 @@
           <a:bodyPr/>
           <a:lstStyle/>
           <a:p>
-            <a:fld id="{12354248-C45D-A849-AA63-3EEE341C7D0E}" type="slidenum">
+            <a:fld id="{251073CA-BA70-3E49-848B-50CFF95855C9}" type="slidenum">
               <a:rPr lang="en-US" smtClean="0"/>
               <a:t>‹#›</a:t>
             </a:fld>
@@ -459,7 +459,7 @@
     </p:spTree>
     <p:extLst>
       <p:ext uri="{BB962C8B-B14F-4D97-AF65-F5344CB8AC3E}">
-        <p14:creationId xmlns:p14="http://schemas.microsoft.com/office/powerpoint/2010/main" val="646529035"/>
+        <p14:creationId xmlns:p14="http://schemas.microsoft.com/office/powerpoint/2010/main" val="388282727"/>
       </p:ext>
     </p:extLst>
   </p:cSld>
@@ -586,9 +586,9 @@
           <a:bodyPr/>
           <a:lstStyle/>
           <a:p>
-            <a:fld id="{5BE2238D-E45F-2D46-BC69-38133F83DDFF}" type="datetimeFigureOut">
-              <a:rPr lang="en-US" smtClean="0"/>
-              <a:t>12/20/17</a:t>
+            <a:fld id="{BCB45ABD-EF6E-524E-9C46-34C28651C21A}" type="datetimeFigureOut">
+              <a:rPr lang="en-US" smtClean="0"/>
+              <a:t>12/27/17</a:t>
             </a:fld>
             <a:endParaRPr lang="en-US"/>
           </a:p>
@@ -628,7 +628,7 @@
           <a:bodyPr/>
           <a:lstStyle/>
           <a:p>
-            <a:fld id="{12354248-C45D-A849-AA63-3EEE341C7D0E}" type="slidenum">
+            <a:fld id="{251073CA-BA70-3E49-848B-50CFF95855C9}" type="slidenum">
               <a:rPr lang="en-US" smtClean="0"/>
               <a:t>‹#›</a:t>
             </a:fld>
@@ -639,7 +639,7 @@
     </p:spTree>
     <p:extLst>
       <p:ext uri="{BB962C8B-B14F-4D97-AF65-F5344CB8AC3E}">
-        <p14:creationId xmlns:p14="http://schemas.microsoft.com/office/powerpoint/2010/main" val="2093721072"/>
+        <p14:creationId xmlns:p14="http://schemas.microsoft.com/office/powerpoint/2010/main" val="1812473103"/>
       </p:ext>
     </p:extLst>
   </p:cSld>
@@ -756,9 +756,9 @@
           <a:bodyPr/>
           <a:lstStyle/>
           <a:p>
-            <a:fld id="{5BE2238D-E45F-2D46-BC69-38133F83DDFF}" type="datetimeFigureOut">
-              <a:rPr lang="en-US" smtClean="0"/>
-              <a:t>12/20/17</a:t>
+            <a:fld id="{BCB45ABD-EF6E-524E-9C46-34C28651C21A}" type="datetimeFigureOut">
+              <a:rPr lang="en-US" smtClean="0"/>
+              <a:t>12/27/17</a:t>
             </a:fld>
             <a:endParaRPr lang="en-US"/>
           </a:p>
@@ -798,7 +798,7 @@
           <a:bodyPr/>
           <a:lstStyle/>
           <a:p>
-            <a:fld id="{12354248-C45D-A849-AA63-3EEE341C7D0E}" type="slidenum">
+            <a:fld id="{251073CA-BA70-3E49-848B-50CFF95855C9}" type="slidenum">
               <a:rPr lang="en-US" smtClean="0"/>
               <a:t>‹#›</a:t>
             </a:fld>
@@ -809,7 +809,7 @@
     </p:spTree>
     <p:extLst>
       <p:ext uri="{BB962C8B-B14F-4D97-AF65-F5344CB8AC3E}">
-        <p14:creationId xmlns:p14="http://schemas.microsoft.com/office/powerpoint/2010/main" val="1987657172"/>
+        <p14:creationId xmlns:p14="http://schemas.microsoft.com/office/powerpoint/2010/main" val="1327246479"/>
       </p:ext>
     </p:extLst>
   </p:cSld>
@@ -1002,9 +1002,9 @@
           <a:bodyPr/>
           <a:lstStyle/>
           <a:p>
-            <a:fld id="{5BE2238D-E45F-2D46-BC69-38133F83DDFF}" type="datetimeFigureOut">
-              <a:rPr lang="en-US" smtClean="0"/>
-              <a:t>12/20/17</a:t>
+            <a:fld id="{BCB45ABD-EF6E-524E-9C46-34C28651C21A}" type="datetimeFigureOut">
+              <a:rPr lang="en-US" smtClean="0"/>
+              <a:t>12/27/17</a:t>
             </a:fld>
             <a:endParaRPr lang="en-US"/>
           </a:p>
@@ -1044,7 +1044,7 @@
           <a:bodyPr/>
           <a:lstStyle/>
           <a:p>
-            <a:fld id="{12354248-C45D-A849-AA63-3EEE341C7D0E}" type="slidenum">
+            <a:fld id="{251073CA-BA70-3E49-848B-50CFF95855C9}" type="slidenum">
               <a:rPr lang="en-US" smtClean="0"/>
               <a:t>‹#›</a:t>
             </a:fld>
@@ -1055,7 +1055,7 @@
     </p:spTree>
     <p:extLst>
       <p:ext uri="{BB962C8B-B14F-4D97-AF65-F5344CB8AC3E}">
-        <p14:creationId xmlns:p14="http://schemas.microsoft.com/office/powerpoint/2010/main" val="298477072"/>
+        <p14:creationId xmlns:p14="http://schemas.microsoft.com/office/powerpoint/2010/main" val="1118931164"/>
       </p:ext>
     </p:extLst>
   </p:cSld>
@@ -1234,9 +1234,9 @@
           <a:bodyPr/>
           <a:lstStyle/>
           <a:p>
-            <a:fld id="{5BE2238D-E45F-2D46-BC69-38133F83DDFF}" type="datetimeFigureOut">
-              <a:rPr lang="en-US" smtClean="0"/>
-              <a:t>12/20/17</a:t>
+            <a:fld id="{BCB45ABD-EF6E-524E-9C46-34C28651C21A}" type="datetimeFigureOut">
+              <a:rPr lang="en-US" smtClean="0"/>
+              <a:t>12/27/17</a:t>
             </a:fld>
             <a:endParaRPr lang="en-US"/>
           </a:p>
@@ -1276,7 +1276,7 @@
           <a:bodyPr/>
           <a:lstStyle/>
           <a:p>
-            <a:fld id="{12354248-C45D-A849-AA63-3EEE341C7D0E}" type="slidenum">
+            <a:fld id="{251073CA-BA70-3E49-848B-50CFF95855C9}" type="slidenum">
               <a:rPr lang="en-US" smtClean="0"/>
               <a:t>‹#›</a:t>
             </a:fld>
@@ -1287,7 +1287,7 @@
     </p:spTree>
     <p:extLst>
       <p:ext uri="{BB962C8B-B14F-4D97-AF65-F5344CB8AC3E}">
-        <p14:creationId xmlns:p14="http://schemas.microsoft.com/office/powerpoint/2010/main" val="2129833359"/>
+        <p14:creationId xmlns:p14="http://schemas.microsoft.com/office/powerpoint/2010/main" val="361776569"/>
       </p:ext>
     </p:extLst>
   </p:cSld>
@@ -1601,9 +1601,9 @@
           <a:bodyPr/>
           <a:lstStyle/>
           <a:p>
-            <a:fld id="{5BE2238D-E45F-2D46-BC69-38133F83DDFF}" type="datetimeFigureOut">
-              <a:rPr lang="en-US" smtClean="0"/>
-              <a:t>12/20/17</a:t>
+            <a:fld id="{BCB45ABD-EF6E-524E-9C46-34C28651C21A}" type="datetimeFigureOut">
+              <a:rPr lang="en-US" smtClean="0"/>
+              <a:t>12/27/17</a:t>
             </a:fld>
             <a:endParaRPr lang="en-US"/>
           </a:p>
@@ -1643,7 +1643,7 @@
           <a:bodyPr/>
           <a:lstStyle/>
           <a:p>
-            <a:fld id="{12354248-C45D-A849-AA63-3EEE341C7D0E}" type="slidenum">
+            <a:fld id="{251073CA-BA70-3E49-848B-50CFF95855C9}" type="slidenum">
               <a:rPr lang="en-US" smtClean="0"/>
               <a:t>‹#›</a:t>
             </a:fld>
@@ -1654,7 +1654,7 @@
     </p:spTree>
     <p:extLst>
       <p:ext uri="{BB962C8B-B14F-4D97-AF65-F5344CB8AC3E}">
-        <p14:creationId xmlns:p14="http://schemas.microsoft.com/office/powerpoint/2010/main" val="1851836517"/>
+        <p14:creationId xmlns:p14="http://schemas.microsoft.com/office/powerpoint/2010/main" val="852590526"/>
       </p:ext>
     </p:extLst>
   </p:cSld>
@@ -1719,9 +1719,9 @@
           <a:bodyPr/>
           <a:lstStyle/>
           <a:p>
-            <a:fld id="{5BE2238D-E45F-2D46-BC69-38133F83DDFF}" type="datetimeFigureOut">
-              <a:rPr lang="en-US" smtClean="0"/>
-              <a:t>12/20/17</a:t>
+            <a:fld id="{BCB45ABD-EF6E-524E-9C46-34C28651C21A}" type="datetimeFigureOut">
+              <a:rPr lang="en-US" smtClean="0"/>
+              <a:t>12/27/17</a:t>
             </a:fld>
             <a:endParaRPr lang="en-US"/>
           </a:p>
@@ -1761,7 +1761,7 @@
           <a:bodyPr/>
           <a:lstStyle/>
           <a:p>
-            <a:fld id="{12354248-C45D-A849-AA63-3EEE341C7D0E}" type="slidenum">
+            <a:fld id="{251073CA-BA70-3E49-848B-50CFF95855C9}" type="slidenum">
               <a:rPr lang="en-US" smtClean="0"/>
               <a:t>‹#›</a:t>
             </a:fld>
@@ -1772,7 +1772,7 @@
     </p:spTree>
     <p:extLst>
       <p:ext uri="{BB962C8B-B14F-4D97-AF65-F5344CB8AC3E}">
-        <p14:creationId xmlns:p14="http://schemas.microsoft.com/office/powerpoint/2010/main" val="335845248"/>
+        <p14:creationId xmlns:p14="http://schemas.microsoft.com/office/powerpoint/2010/main" val="1478077698"/>
       </p:ext>
     </p:extLst>
   </p:cSld>
@@ -1814,9 +1814,9 @@
           <a:bodyPr/>
           <a:lstStyle/>
           <a:p>
-            <a:fld id="{5BE2238D-E45F-2D46-BC69-38133F83DDFF}" type="datetimeFigureOut">
-              <a:rPr lang="en-US" smtClean="0"/>
-              <a:t>12/20/17</a:t>
+            <a:fld id="{BCB45ABD-EF6E-524E-9C46-34C28651C21A}" type="datetimeFigureOut">
+              <a:rPr lang="en-US" smtClean="0"/>
+              <a:t>12/27/17</a:t>
             </a:fld>
             <a:endParaRPr lang="en-US"/>
           </a:p>
@@ -1856,7 +1856,7 @@
           <a:bodyPr/>
           <a:lstStyle/>
           <a:p>
-            <a:fld id="{12354248-C45D-A849-AA63-3EEE341C7D0E}" type="slidenum">
+            <a:fld id="{251073CA-BA70-3E49-848B-50CFF95855C9}" type="slidenum">
               <a:rPr lang="en-US" smtClean="0"/>
               <a:t>‹#›</a:t>
             </a:fld>
@@ -1867,7 +1867,7 @@
     </p:spTree>
     <p:extLst>
       <p:ext uri="{BB962C8B-B14F-4D97-AF65-F5344CB8AC3E}">
-        <p14:creationId xmlns:p14="http://schemas.microsoft.com/office/powerpoint/2010/main" val="964058820"/>
+        <p14:creationId xmlns:p14="http://schemas.microsoft.com/office/powerpoint/2010/main" val="2108525437"/>
       </p:ext>
     </p:extLst>
   </p:cSld>
@@ -2091,9 +2091,9 @@
           <a:bodyPr/>
           <a:lstStyle/>
           <a:p>
-            <a:fld id="{5BE2238D-E45F-2D46-BC69-38133F83DDFF}" type="datetimeFigureOut">
-              <a:rPr lang="en-US" smtClean="0"/>
-              <a:t>12/20/17</a:t>
+            <a:fld id="{BCB45ABD-EF6E-524E-9C46-34C28651C21A}" type="datetimeFigureOut">
+              <a:rPr lang="en-US" smtClean="0"/>
+              <a:t>12/27/17</a:t>
             </a:fld>
             <a:endParaRPr lang="en-US"/>
           </a:p>
@@ -2133,7 +2133,7 @@
           <a:bodyPr/>
           <a:lstStyle/>
           <a:p>
-            <a:fld id="{12354248-C45D-A849-AA63-3EEE341C7D0E}" type="slidenum">
+            <a:fld id="{251073CA-BA70-3E49-848B-50CFF95855C9}" type="slidenum">
               <a:rPr lang="en-US" smtClean="0"/>
               <a:t>‹#›</a:t>
             </a:fld>
@@ -2144,7 +2144,7 @@
     </p:spTree>
     <p:extLst>
       <p:ext uri="{BB962C8B-B14F-4D97-AF65-F5344CB8AC3E}">
-        <p14:creationId xmlns:p14="http://schemas.microsoft.com/office/powerpoint/2010/main" val="172471125"/>
+        <p14:creationId xmlns:p14="http://schemas.microsoft.com/office/powerpoint/2010/main" val="211876865"/>
       </p:ext>
     </p:extLst>
   </p:cSld>
@@ -2344,9 +2344,9 @@
           <a:bodyPr/>
           <a:lstStyle/>
           <a:p>
-            <a:fld id="{5BE2238D-E45F-2D46-BC69-38133F83DDFF}" type="datetimeFigureOut">
-              <a:rPr lang="en-US" smtClean="0"/>
-              <a:t>12/20/17</a:t>
+            <a:fld id="{BCB45ABD-EF6E-524E-9C46-34C28651C21A}" type="datetimeFigureOut">
+              <a:rPr lang="en-US" smtClean="0"/>
+              <a:t>12/27/17</a:t>
             </a:fld>
             <a:endParaRPr lang="en-US"/>
           </a:p>
@@ -2386,7 +2386,7 @@
           <a:bodyPr/>
           <a:lstStyle/>
           <a:p>
-            <a:fld id="{12354248-C45D-A849-AA63-3EEE341C7D0E}" type="slidenum">
+            <a:fld id="{251073CA-BA70-3E49-848B-50CFF95855C9}" type="slidenum">
               <a:rPr lang="en-US" smtClean="0"/>
               <a:t>‹#›</a:t>
             </a:fld>
@@ -2397,7 +2397,7 @@
     </p:spTree>
     <p:extLst>
       <p:ext uri="{BB962C8B-B14F-4D97-AF65-F5344CB8AC3E}">
-        <p14:creationId xmlns:p14="http://schemas.microsoft.com/office/powerpoint/2010/main" val="1766758072"/>
+        <p14:creationId xmlns:p14="http://schemas.microsoft.com/office/powerpoint/2010/main" val="486583329"/>
       </p:ext>
     </p:extLst>
   </p:cSld>
@@ -2557,9 +2557,9 @@
             </a:lvl1pPr>
           </a:lstStyle>
           <a:p>
-            <a:fld id="{5BE2238D-E45F-2D46-BC69-38133F83DDFF}" type="datetimeFigureOut">
-              <a:rPr lang="en-US" smtClean="0"/>
-              <a:t>12/20/17</a:t>
+            <a:fld id="{BCB45ABD-EF6E-524E-9C46-34C28651C21A}" type="datetimeFigureOut">
+              <a:rPr lang="en-US" smtClean="0"/>
+              <a:t>12/27/17</a:t>
             </a:fld>
             <a:endParaRPr lang="en-US"/>
           </a:p>
@@ -2635,7 +2635,7 @@
             </a:lvl1pPr>
           </a:lstStyle>
           <a:p>
-            <a:fld id="{12354248-C45D-A849-AA63-3EEE341C7D0E}" type="slidenum">
+            <a:fld id="{251073CA-BA70-3E49-848B-50CFF95855C9}" type="slidenum">
               <a:rPr lang="en-US" smtClean="0"/>
               <a:t>‹#›</a:t>
             </a:fld>
@@ -2646,7 +2646,7 @@
     </p:spTree>
     <p:extLst>
       <p:ext uri="{BB962C8B-B14F-4D97-AF65-F5344CB8AC3E}">
-        <p14:creationId xmlns:p14="http://schemas.microsoft.com/office/powerpoint/2010/main" val="1149994044"/>
+        <p14:creationId xmlns:p14="http://schemas.microsoft.com/office/powerpoint/2010/main" val="1982418340"/>
       </p:ext>
     </p:extLst>
   </p:cSld>
@@ -2964,40 +2964,526 @@
           <a:chExt cx="0" cy="0"/>
         </a:xfrm>
       </p:grpSpPr>
+      <p:pic>
+        <p:nvPicPr>
+          <p:cNvPr id="5" name="Picture 4"/>
+          <p:cNvPicPr>
+            <a:picLocks noChangeAspect="1"/>
+          </p:cNvPicPr>
+          <p:nvPr/>
+        </p:nvPicPr>
+        <p:blipFill>
+          <a:blip r:embed="rId2">
+            <a:extLst>
+              <a:ext uri="{28A0092B-C50C-407E-A947-70E740481C1C}">
+                <a14:useLocalDpi xmlns:a14="http://schemas.microsoft.com/office/drawing/2010/main" val="0"/>
+              </a:ext>
+            </a:extLst>
+          </a:blip>
+          <a:stretch>
+            <a:fillRect/>
+          </a:stretch>
+        </p:blipFill>
+        <p:spPr>
+          <a:xfrm>
+            <a:off x="1534873" y="2286259"/>
+            <a:ext cx="4802373" cy="2729621"/>
+          </a:xfrm>
+          <a:prstGeom prst="rect">
+            <a:avLst/>
+          </a:prstGeom>
+        </p:spPr>
+      </p:pic>
+      <p:sp>
+        <p:nvSpPr>
+          <p:cNvPr id="6" name="Rounded Rectangle 5"/>
+          <p:cNvSpPr/>
+          <p:nvPr/>
+        </p:nvSpPr>
+        <p:spPr>
+          <a:xfrm>
+            <a:off x="1654157" y="5015880"/>
+            <a:ext cx="1312119" cy="335003"/>
+          </a:xfrm>
+          <a:prstGeom prst="roundRect">
+            <a:avLst/>
+          </a:prstGeom>
+        </p:spPr>
+        <p:style>
+          <a:lnRef idx="2">
+            <a:schemeClr val="accent1">
+              <a:shade val="50000"/>
+            </a:schemeClr>
+          </a:lnRef>
+          <a:fillRef idx="1">
+            <a:schemeClr val="accent1"/>
+          </a:fillRef>
+          <a:effectRef idx="0">
+            <a:schemeClr val="accent1"/>
+          </a:effectRef>
+          <a:fontRef idx="minor">
+            <a:schemeClr val="lt1"/>
+          </a:fontRef>
+        </p:style>
+        <p:txBody>
+          <a:bodyPr rtlCol="0" anchor="ctr"/>
+          <a:lstStyle/>
+          <a:p>
+            <a:pPr algn="ctr"/>
+            <a:r>
+              <a:rPr lang="en-US" dirty="0" smtClean="0"/>
+              <a:t>O.S.</a:t>
+            </a:r>
+            <a:endParaRPr lang="en-US" dirty="0"/>
+          </a:p>
+        </p:txBody>
+      </p:sp>
+      <p:sp>
+        <p:nvSpPr>
+          <p:cNvPr id="7" name="Rounded Rectangle 6"/>
+          <p:cNvSpPr/>
+          <p:nvPr/>
+        </p:nvSpPr>
+        <p:spPr>
+          <a:xfrm>
+            <a:off x="3245929" y="4995057"/>
+            <a:ext cx="1312119" cy="335003"/>
+          </a:xfrm>
+          <a:prstGeom prst="roundRect">
+            <a:avLst/>
+          </a:prstGeom>
+        </p:spPr>
+        <p:style>
+          <a:lnRef idx="2">
+            <a:schemeClr val="accent1">
+              <a:shade val="50000"/>
+            </a:schemeClr>
+          </a:lnRef>
+          <a:fillRef idx="1">
+            <a:schemeClr val="accent1"/>
+          </a:fillRef>
+          <a:effectRef idx="0">
+            <a:schemeClr val="accent1"/>
+          </a:effectRef>
+          <a:fontRef idx="minor">
+            <a:schemeClr val="lt1"/>
+          </a:fontRef>
+        </p:style>
+        <p:txBody>
+          <a:bodyPr rtlCol="0" anchor="ctr"/>
+          <a:lstStyle/>
+          <a:p>
+            <a:pPr algn="ctr"/>
+            <a:r>
+              <a:rPr lang="en-US" dirty="0" smtClean="0"/>
+              <a:t>O.S.</a:t>
+            </a:r>
+            <a:endParaRPr lang="en-US" dirty="0"/>
+          </a:p>
+        </p:txBody>
+      </p:sp>
+      <p:sp>
+        <p:nvSpPr>
+          <p:cNvPr id="8" name="Rounded Rectangle 7"/>
+          <p:cNvSpPr/>
+          <p:nvPr/>
+        </p:nvSpPr>
+        <p:spPr>
+          <a:xfrm>
+            <a:off x="4837700" y="4995057"/>
+            <a:ext cx="1312119" cy="335003"/>
+          </a:xfrm>
+          <a:prstGeom prst="roundRect">
+            <a:avLst/>
+          </a:prstGeom>
+        </p:spPr>
+        <p:style>
+          <a:lnRef idx="2">
+            <a:schemeClr val="accent1">
+              <a:shade val="50000"/>
+            </a:schemeClr>
+          </a:lnRef>
+          <a:fillRef idx="1">
+            <a:schemeClr val="accent1"/>
+          </a:fillRef>
+          <a:effectRef idx="0">
+            <a:schemeClr val="accent1"/>
+          </a:effectRef>
+          <a:fontRef idx="minor">
+            <a:schemeClr val="lt1"/>
+          </a:fontRef>
+        </p:style>
+        <p:txBody>
+          <a:bodyPr rtlCol="0" anchor="ctr"/>
+          <a:lstStyle/>
+          <a:p>
+            <a:pPr algn="ctr"/>
+            <a:r>
+              <a:rPr lang="en-US" dirty="0" smtClean="0"/>
+              <a:t>O.S.</a:t>
+            </a:r>
+            <a:endParaRPr lang="en-US" dirty="0"/>
+          </a:p>
+        </p:txBody>
+      </p:sp>
+      <p:sp>
+        <p:nvSpPr>
+          <p:cNvPr id="10" name="Rounded Rectangle 9"/>
+          <p:cNvSpPr/>
+          <p:nvPr/>
+        </p:nvSpPr>
+        <p:spPr>
+          <a:xfrm>
+            <a:off x="1654156" y="5384030"/>
+            <a:ext cx="1312119" cy="335003"/>
+          </a:xfrm>
+          <a:prstGeom prst="roundRect">
+            <a:avLst/>
+          </a:prstGeom>
+        </p:spPr>
+        <p:style>
+          <a:lnRef idx="2">
+            <a:schemeClr val="accent1">
+              <a:shade val="50000"/>
+            </a:schemeClr>
+          </a:lnRef>
+          <a:fillRef idx="1">
+            <a:schemeClr val="accent1"/>
+          </a:fillRef>
+          <a:effectRef idx="0">
+            <a:schemeClr val="accent1"/>
+          </a:effectRef>
+          <a:fontRef idx="minor">
+            <a:schemeClr val="lt1"/>
+          </a:fontRef>
+        </p:style>
+        <p:txBody>
+          <a:bodyPr rtlCol="0" anchor="ctr"/>
+          <a:lstStyle/>
+          <a:p>
+            <a:pPr algn="ctr"/>
+            <a:r>
+              <a:rPr lang="en-US" dirty="0" smtClean="0"/>
+              <a:t>H.W.</a:t>
+            </a:r>
+            <a:endParaRPr lang="en-US" dirty="0"/>
+          </a:p>
+        </p:txBody>
+      </p:sp>
+      <p:sp>
+        <p:nvSpPr>
+          <p:cNvPr id="11" name="TextBox 10"/>
+          <p:cNvSpPr txBox="1"/>
+          <p:nvPr/>
+        </p:nvSpPr>
+        <p:spPr>
+          <a:xfrm>
+            <a:off x="2107992" y="5844438"/>
+            <a:ext cx="454553" cy="252314"/>
+          </a:xfrm>
+          <a:prstGeom prst="rect">
+            <a:avLst/>
+          </a:prstGeom>
+          <a:noFill/>
+        </p:spPr>
+        <p:txBody>
+          <a:bodyPr wrap="none" rtlCol="0">
+            <a:spAutoFit/>
+          </a:bodyPr>
+          <a:lstStyle/>
+          <a:p>
+            <a:r>
+              <a:rPr lang="en-US" dirty="0" smtClean="0"/>
+              <a:t>Host</a:t>
+            </a:r>
+            <a:endParaRPr lang="en-US" dirty="0"/>
+          </a:p>
+        </p:txBody>
+      </p:sp>
+      <p:sp>
+        <p:nvSpPr>
+          <p:cNvPr id="12" name="Rounded Rectangle 11"/>
+          <p:cNvSpPr/>
+          <p:nvPr/>
+        </p:nvSpPr>
+        <p:spPr>
+          <a:xfrm>
+            <a:off x="3266554" y="5400297"/>
+            <a:ext cx="1312119" cy="335003"/>
+          </a:xfrm>
+          <a:prstGeom prst="roundRect">
+            <a:avLst/>
+          </a:prstGeom>
+        </p:spPr>
+        <p:style>
+          <a:lnRef idx="2">
+            <a:schemeClr val="accent1">
+              <a:shade val="50000"/>
+            </a:schemeClr>
+          </a:lnRef>
+          <a:fillRef idx="1">
+            <a:schemeClr val="accent1"/>
+          </a:fillRef>
+          <a:effectRef idx="0">
+            <a:schemeClr val="accent1"/>
+          </a:effectRef>
+          <a:fontRef idx="minor">
+            <a:schemeClr val="lt1"/>
+          </a:fontRef>
+        </p:style>
+        <p:txBody>
+          <a:bodyPr rtlCol="0" anchor="ctr"/>
+          <a:lstStyle/>
+          <a:p>
+            <a:pPr algn="ctr"/>
+            <a:r>
+              <a:rPr lang="en-US" dirty="0" smtClean="0"/>
+              <a:t>H.W.</a:t>
+            </a:r>
+            <a:endParaRPr lang="en-US" dirty="0"/>
+          </a:p>
+        </p:txBody>
+      </p:sp>
+      <p:sp>
+        <p:nvSpPr>
+          <p:cNvPr id="13" name="Rounded Rectangle 12"/>
+          <p:cNvSpPr/>
+          <p:nvPr/>
+        </p:nvSpPr>
+        <p:spPr>
+          <a:xfrm>
+            <a:off x="4837700" y="5400297"/>
+            <a:ext cx="1312119" cy="335003"/>
+          </a:xfrm>
+          <a:prstGeom prst="roundRect">
+            <a:avLst/>
+          </a:prstGeom>
+        </p:spPr>
+        <p:style>
+          <a:lnRef idx="2">
+            <a:schemeClr val="accent1">
+              <a:shade val="50000"/>
+            </a:schemeClr>
+          </a:lnRef>
+          <a:fillRef idx="1">
+            <a:schemeClr val="accent1"/>
+          </a:fillRef>
+          <a:effectRef idx="0">
+            <a:schemeClr val="accent1"/>
+          </a:effectRef>
+          <a:fontRef idx="minor">
+            <a:schemeClr val="lt1"/>
+          </a:fontRef>
+        </p:style>
+        <p:txBody>
+          <a:bodyPr rtlCol="0" anchor="ctr"/>
+          <a:lstStyle/>
+          <a:p>
+            <a:pPr algn="ctr"/>
+            <a:r>
+              <a:rPr lang="en-US" dirty="0" smtClean="0"/>
+              <a:t>H.W.</a:t>
+            </a:r>
+            <a:endParaRPr lang="en-US" dirty="0"/>
+          </a:p>
+        </p:txBody>
+      </p:sp>
+      <p:sp>
+        <p:nvSpPr>
+          <p:cNvPr id="14" name="Rectangle 13"/>
+          <p:cNvSpPr/>
+          <p:nvPr/>
+        </p:nvSpPr>
+        <p:spPr>
+          <a:xfrm>
+            <a:off x="3225302" y="2119639"/>
+            <a:ext cx="1512954" cy="4044825"/>
+          </a:xfrm>
+          <a:prstGeom prst="rect">
+            <a:avLst/>
+          </a:prstGeom>
+          <a:solidFill>
+            <a:schemeClr val="bg1">
+              <a:alpha val="0"/>
+            </a:schemeClr>
+          </a:solidFill>
+          <a:ln w="31750">
+            <a:solidFill>
+              <a:schemeClr val="accent6"/>
+            </a:solidFill>
+          </a:ln>
+        </p:spPr>
+        <p:style>
+          <a:lnRef idx="2">
+            <a:schemeClr val="accent1">
+              <a:shade val="50000"/>
+            </a:schemeClr>
+          </a:lnRef>
+          <a:fillRef idx="1">
+            <a:schemeClr val="accent1"/>
+          </a:fillRef>
+          <a:effectRef idx="0">
+            <a:schemeClr val="accent1"/>
+          </a:effectRef>
+          <a:fontRef idx="minor">
+            <a:schemeClr val="lt1"/>
+          </a:fontRef>
+        </p:style>
+        <p:txBody>
+          <a:bodyPr rtlCol="0" anchor="ctr"/>
+          <a:lstStyle/>
+          <a:p>
+            <a:pPr algn="ctr"/>
+            <a:endParaRPr lang="en-US"/>
+          </a:p>
+        </p:txBody>
+      </p:sp>
+      <p:sp>
+        <p:nvSpPr>
+          <p:cNvPr id="16" name="TextBox 15"/>
+          <p:cNvSpPr txBox="1"/>
+          <p:nvPr/>
+        </p:nvSpPr>
+        <p:spPr>
+          <a:xfrm>
+            <a:off x="3674711" y="5842170"/>
+            <a:ext cx="454553" cy="252314"/>
+          </a:xfrm>
+          <a:prstGeom prst="rect">
+            <a:avLst/>
+          </a:prstGeom>
+          <a:noFill/>
+        </p:spPr>
+        <p:txBody>
+          <a:bodyPr wrap="none" rtlCol="0">
+            <a:spAutoFit/>
+          </a:bodyPr>
+          <a:lstStyle/>
+          <a:p>
+            <a:r>
+              <a:rPr lang="en-US" smtClean="0"/>
+              <a:t>Host</a:t>
+            </a:r>
+            <a:endParaRPr lang="en-US"/>
+          </a:p>
+        </p:txBody>
+      </p:sp>
+      <p:sp>
+        <p:nvSpPr>
+          <p:cNvPr id="17" name="TextBox 16"/>
+          <p:cNvSpPr txBox="1"/>
+          <p:nvPr/>
+        </p:nvSpPr>
+        <p:spPr>
+          <a:xfrm>
+            <a:off x="5266482" y="5846116"/>
+            <a:ext cx="454553" cy="252314"/>
+          </a:xfrm>
+          <a:prstGeom prst="rect">
+            <a:avLst/>
+          </a:prstGeom>
+          <a:noFill/>
+        </p:spPr>
+        <p:txBody>
+          <a:bodyPr wrap="none" rtlCol="0">
+            <a:spAutoFit/>
+          </a:bodyPr>
+          <a:lstStyle/>
+          <a:p>
+            <a:r>
+              <a:rPr lang="en-US" dirty="0" smtClean="0"/>
+              <a:t>Host</a:t>
+            </a:r>
+            <a:endParaRPr lang="en-US" dirty="0"/>
+          </a:p>
+        </p:txBody>
+      </p:sp>
+      <p:sp>
+        <p:nvSpPr>
+          <p:cNvPr id="9" name="Rectangle 8"/>
+          <p:cNvSpPr/>
+          <p:nvPr/>
+        </p:nvSpPr>
+        <p:spPr>
+          <a:xfrm>
+            <a:off x="1527544" y="2119639"/>
+            <a:ext cx="1615450" cy="4044825"/>
+          </a:xfrm>
+          <a:prstGeom prst="rect">
+            <a:avLst/>
+          </a:prstGeom>
+          <a:solidFill>
+            <a:schemeClr val="bg1">
+              <a:alpha val="0"/>
+            </a:schemeClr>
+          </a:solidFill>
+          <a:ln w="31750">
+            <a:solidFill>
+              <a:schemeClr val="accent6"/>
+            </a:solidFill>
+          </a:ln>
+        </p:spPr>
+        <p:style>
+          <a:lnRef idx="2">
+            <a:schemeClr val="accent1">
+              <a:shade val="50000"/>
+            </a:schemeClr>
+          </a:lnRef>
+          <a:fillRef idx="1">
+            <a:schemeClr val="accent1"/>
+          </a:fillRef>
+          <a:effectRef idx="0">
+            <a:schemeClr val="accent1"/>
+          </a:effectRef>
+          <a:fontRef idx="minor">
+            <a:schemeClr val="lt1"/>
+          </a:fontRef>
+        </p:style>
+        <p:txBody>
+          <a:bodyPr rtlCol="0" anchor="ctr"/>
+          <a:lstStyle/>
+          <a:p>
+            <a:pPr algn="ctr"/>
+            <a:endParaRPr lang="en-US"/>
+          </a:p>
+        </p:txBody>
+      </p:sp>
       <p:grpSp>
         <p:nvGrpSpPr>
-          <p:cNvPr id="10" name="Group 9"/>
+          <p:cNvPr id="35" name="Group 34"/>
           <p:cNvGrpSpPr/>
           <p:nvPr/>
         </p:nvGrpSpPr>
         <p:grpSpPr>
           <a:xfrm>
-            <a:off x="1815875" y="401444"/>
-            <a:ext cx="3197383" cy="3285021"/>
-            <a:chOff x="2050050" y="1728439"/>
-            <a:chExt cx="3197383" cy="3285021"/>
+            <a:off x="7136780" y="1897998"/>
+            <a:ext cx="2606686" cy="4266466"/>
+            <a:chOff x="9043639" y="2062976"/>
+            <a:chExt cx="2606686" cy="4025467"/>
           </a:xfrm>
         </p:grpSpPr>
         <p:sp>
           <p:nvSpPr>
-            <p:cNvPr id="6" name="Rectangle 5"/>
+            <p:cNvPr id="22" name="Rectangle 21"/>
             <p:cNvSpPr/>
             <p:nvPr/>
           </p:nvSpPr>
           <p:spPr>
             <a:xfrm>
-              <a:off x="2050050" y="1728439"/>
-              <a:ext cx="3197383" cy="3245005"/>
+              <a:off x="9495131" y="2274849"/>
+              <a:ext cx="2155194" cy="3791414"/>
             </a:xfrm>
             <a:prstGeom prst="rect">
               <a:avLst/>
             </a:prstGeom>
             <a:solidFill>
-              <a:schemeClr val="bg1"/>
+              <a:schemeClr val="bg1">
+                <a:alpha val="0"/>
+              </a:schemeClr>
             </a:solidFill>
-            <a:ln w="22225">
+            <a:ln w="31750">
               <a:solidFill>
-                <a:schemeClr val="tx1"/>
+                <a:schemeClr val="accent6"/>
               </a:solidFill>
             </a:ln>
           </p:spPr>
@@ -3022,80 +3508,20 @@
             <a:lstStyle/>
             <a:p>
               <a:pPr algn="ctr"/>
-              <a:endParaRPr lang="en-US" dirty="0"/>
-            </a:p>
-          </p:txBody>
-        </p:sp>
-        <p:pic>
-          <p:nvPicPr>
-            <p:cNvPr id="4" name="Picture 3"/>
-            <p:cNvPicPr>
-              <a:picLocks noChangeAspect="1"/>
-            </p:cNvPicPr>
-            <p:nvPr/>
-          </p:nvPicPr>
-          <p:blipFill>
-            <a:blip r:embed="rId2">
-              <a:extLst>
-                <a:ext uri="{28A0092B-C50C-407E-A947-70E740481C1C}">
-                  <a14:useLocalDpi xmlns:a14="http://schemas.microsoft.com/office/drawing/2010/main" val="0"/>
-                </a:ext>
-              </a:extLst>
-            </a:blip>
-            <a:stretch>
-              <a:fillRect/>
-            </a:stretch>
-          </p:blipFill>
-          <p:spPr>
-            <a:xfrm>
-              <a:off x="2050050" y="1964783"/>
-              <a:ext cx="3197383" cy="2376094"/>
-            </a:xfrm>
-            <a:prstGeom prst="rect">
-              <a:avLst/>
-            </a:prstGeom>
-          </p:spPr>
-        </p:pic>
-        <p:sp>
-          <p:nvSpPr>
-            <p:cNvPr id="7" name="TextBox 6"/>
-            <p:cNvSpPr txBox="1"/>
-            <p:nvPr/>
-          </p:nvSpPr>
-          <p:spPr>
-            <a:xfrm>
-              <a:off x="3341284" y="4644128"/>
-              <a:ext cx="614912" cy="369332"/>
-            </a:xfrm>
-            <a:prstGeom prst="rect">
-              <a:avLst/>
-            </a:prstGeom>
-            <a:noFill/>
-          </p:spPr>
-          <p:txBody>
-            <a:bodyPr wrap="none" rtlCol="0">
-              <a:spAutoFit/>
-            </a:bodyPr>
-            <a:lstStyle/>
-            <a:p>
-              <a:r>
-                <a:rPr lang="en-US" smtClean="0"/>
-                <a:t>Host</a:t>
-              </a:r>
               <a:endParaRPr lang="en-US"/>
             </a:p>
           </p:txBody>
         </p:sp>
         <p:sp>
           <p:nvSpPr>
-            <p:cNvPr id="8" name="Rounded Rectangle 7"/>
+            <p:cNvPr id="23" name="Rounded Rectangle 22"/>
             <p:cNvSpPr/>
             <p:nvPr/>
           </p:nvSpPr>
           <p:spPr>
             <a:xfrm>
-              <a:off x="2092258" y="4340877"/>
-              <a:ext cx="3112965" cy="342635"/>
+              <a:off x="9688623" y="4589031"/>
+              <a:ext cx="1775013" cy="490371"/>
             </a:xfrm>
             <a:prstGeom prst="roundRect">
               <a:avLst/>
@@ -3123,146 +3549,23 @@
             <a:p>
               <a:pPr algn="ctr"/>
               <a:r>
-                <a:rPr lang="en-US" smtClean="0"/>
+                <a:rPr lang="en-US" dirty="0" smtClean="0"/>
                 <a:t>O.S.</a:t>
               </a:r>
-              <a:endParaRPr lang="en-US"/>
+              <a:endParaRPr lang="en-US" dirty="0"/>
             </a:p>
           </p:txBody>
         </p:sp>
-      </p:grpSp>
-      <p:grpSp>
-        <p:nvGrpSpPr>
-          <p:cNvPr id="11" name="Group 10"/>
-          <p:cNvGrpSpPr/>
-          <p:nvPr/>
-        </p:nvGrpSpPr>
-        <p:grpSpPr>
-          <a:xfrm>
-            <a:off x="7131289" y="401444"/>
-            <a:ext cx="3197383" cy="3285021"/>
-            <a:chOff x="2050050" y="1728439"/>
-            <a:chExt cx="3197383" cy="3285021"/>
-          </a:xfrm>
-        </p:grpSpPr>
         <p:sp>
           <p:nvSpPr>
-            <p:cNvPr id="12" name="Rectangle 11"/>
+            <p:cNvPr id="24" name="Rounded Rectangle 23"/>
             <p:cNvSpPr/>
             <p:nvPr/>
           </p:nvSpPr>
           <p:spPr>
             <a:xfrm>
-              <a:off x="2050050" y="1728439"/>
-              <a:ext cx="3197383" cy="3245005"/>
-            </a:xfrm>
-            <a:prstGeom prst="rect">
-              <a:avLst/>
-            </a:prstGeom>
-            <a:solidFill>
-              <a:schemeClr val="bg1"/>
-            </a:solidFill>
-            <a:ln w="22225">
-              <a:solidFill>
-                <a:schemeClr val="tx1"/>
-              </a:solidFill>
-            </a:ln>
-          </p:spPr>
-          <p:style>
-            <a:lnRef idx="2">
-              <a:schemeClr val="accent1">
-                <a:shade val="50000"/>
-              </a:schemeClr>
-            </a:lnRef>
-            <a:fillRef idx="1">
-              <a:schemeClr val="accent1"/>
-            </a:fillRef>
-            <a:effectRef idx="0">
-              <a:schemeClr val="accent1"/>
-            </a:effectRef>
-            <a:fontRef idx="minor">
-              <a:schemeClr val="lt1"/>
-            </a:fontRef>
-          </p:style>
-          <p:txBody>
-            <a:bodyPr rtlCol="0" anchor="ctr"/>
-            <a:lstStyle/>
-            <a:p>
-              <a:pPr algn="ctr"/>
-              <a:endParaRPr lang="en-US" dirty="0"/>
-            </a:p>
-          </p:txBody>
-        </p:sp>
-        <p:pic>
-          <p:nvPicPr>
-            <p:cNvPr id="13" name="Picture 12"/>
-            <p:cNvPicPr>
-              <a:picLocks noChangeAspect="1"/>
-            </p:cNvPicPr>
-            <p:nvPr/>
-          </p:nvPicPr>
-          <p:blipFill>
-            <a:blip r:embed="rId2">
-              <a:extLst>
-                <a:ext uri="{28A0092B-C50C-407E-A947-70E740481C1C}">
-                  <a14:useLocalDpi xmlns:a14="http://schemas.microsoft.com/office/drawing/2010/main" val="0"/>
-                </a:ext>
-              </a:extLst>
-            </a:blip>
-            <a:stretch>
-              <a:fillRect/>
-            </a:stretch>
-          </p:blipFill>
-          <p:spPr>
-            <a:xfrm>
-              <a:off x="2050050" y="1964783"/>
-              <a:ext cx="3197383" cy="2376094"/>
-            </a:xfrm>
-            <a:prstGeom prst="rect">
-              <a:avLst/>
-            </a:prstGeom>
-          </p:spPr>
-        </p:pic>
-        <p:sp>
-          <p:nvSpPr>
-            <p:cNvPr id="14" name="TextBox 13"/>
-            <p:cNvSpPr txBox="1"/>
-            <p:nvPr/>
-          </p:nvSpPr>
-          <p:spPr>
-            <a:xfrm>
-              <a:off x="3341284" y="4644128"/>
-              <a:ext cx="614912" cy="369332"/>
-            </a:xfrm>
-            <a:prstGeom prst="rect">
-              <a:avLst/>
-            </a:prstGeom>
-            <a:noFill/>
-          </p:spPr>
-          <p:txBody>
-            <a:bodyPr wrap="none" rtlCol="0">
-              <a:spAutoFit/>
-            </a:bodyPr>
-            <a:lstStyle/>
-            <a:p>
-              <a:r>
-                <a:rPr lang="en-US" smtClean="0"/>
-                <a:t>Host</a:t>
-              </a:r>
-              <a:endParaRPr lang="en-US"/>
-            </a:p>
-          </p:txBody>
-        </p:sp>
-        <p:sp>
-          <p:nvSpPr>
-            <p:cNvPr id="15" name="Rounded Rectangle 14"/>
-            <p:cNvSpPr/>
-            <p:nvPr/>
-          </p:nvSpPr>
-          <p:spPr>
-            <a:xfrm>
-              <a:off x="2092258" y="4340877"/>
-              <a:ext cx="3112965" cy="342635"/>
+              <a:off x="9688622" y="5182214"/>
+              <a:ext cx="1775013" cy="490371"/>
             </a:xfrm>
             <a:prstGeom prst="roundRect">
               <a:avLst/>
@@ -3290,85 +3593,22 @@
             <a:p>
               <a:pPr algn="ctr"/>
               <a:r>
-                <a:rPr lang="en-US" smtClean="0"/>
-                <a:t>O.S.</a:t>
+                <a:rPr lang="en-US" dirty="0" smtClean="0"/>
+                <a:t>H.W.</a:t>
               </a:r>
-              <a:endParaRPr lang="en-US"/>
-            </a:p>
-          </p:txBody>
-        </p:sp>
-      </p:grpSp>
-      <p:grpSp>
-        <p:nvGrpSpPr>
-          <p:cNvPr id="27" name="Group 26"/>
-          <p:cNvGrpSpPr/>
-          <p:nvPr/>
-        </p:nvGrpSpPr>
-        <p:grpSpPr>
-          <a:xfrm>
-            <a:off x="5029156" y="4222749"/>
-            <a:ext cx="2144341" cy="2334454"/>
-            <a:chOff x="5731727" y="5040351"/>
-            <a:chExt cx="2144341" cy="2334454"/>
-          </a:xfrm>
-        </p:grpSpPr>
-        <p:sp>
-          <p:nvSpPr>
-            <p:cNvPr id="17" name="Rectangle 16"/>
-            <p:cNvSpPr/>
-            <p:nvPr/>
-          </p:nvSpPr>
-          <p:spPr>
-            <a:xfrm>
-              <a:off x="5731727" y="5040351"/>
-              <a:ext cx="2144341" cy="2294754"/>
-            </a:xfrm>
-            <a:prstGeom prst="rect">
-              <a:avLst/>
-            </a:prstGeom>
-            <a:solidFill>
-              <a:schemeClr val="bg1"/>
-            </a:solidFill>
-            <a:ln w="22225">
-              <a:solidFill>
-                <a:schemeClr val="tx1"/>
-              </a:solidFill>
-            </a:ln>
-          </p:spPr>
-          <p:style>
-            <a:lnRef idx="2">
-              <a:schemeClr val="accent1">
-                <a:shade val="50000"/>
-              </a:schemeClr>
-            </a:lnRef>
-            <a:fillRef idx="1">
-              <a:schemeClr val="accent1"/>
-            </a:fillRef>
-            <a:effectRef idx="0">
-              <a:schemeClr val="accent1"/>
-            </a:effectRef>
-            <a:fontRef idx="minor">
-              <a:schemeClr val="lt1"/>
-            </a:fontRef>
-          </p:style>
-          <p:txBody>
-            <a:bodyPr rtlCol="0" anchor="ctr"/>
-            <a:lstStyle/>
-            <a:p>
-              <a:pPr algn="ctr"/>
               <a:endParaRPr lang="en-US" dirty="0"/>
             </a:p>
           </p:txBody>
         </p:sp>
         <p:sp>
           <p:nvSpPr>
-            <p:cNvPr id="19" name="TextBox 18"/>
+            <p:cNvPr id="29" name="TextBox 28"/>
             <p:cNvSpPr txBox="1"/>
             <p:nvPr/>
           </p:nvSpPr>
           <p:spPr>
             <a:xfrm>
-              <a:off x="6475336" y="7005473"/>
+              <a:off x="10265271" y="5719111"/>
               <a:ext cx="614912" cy="369332"/>
             </a:xfrm>
             <a:prstGeom prst="rect">
@@ -3392,69 +3632,25 @@
         </p:sp>
         <p:sp>
           <p:nvSpPr>
-            <p:cNvPr id="20" name="Rounded Rectangle 19"/>
+            <p:cNvPr id="30" name="Rounded Rectangle 29"/>
             <p:cNvSpPr/>
             <p:nvPr/>
           </p:nvSpPr>
           <p:spPr>
             <a:xfrm>
-              <a:off x="5731727" y="6702538"/>
-              <a:ext cx="2102131" cy="342635"/>
-            </a:xfrm>
-            <a:prstGeom prst="roundRect">
-              <a:avLst/>
-            </a:prstGeom>
-          </p:spPr>
-          <p:style>
-            <a:lnRef idx="2">
-              <a:schemeClr val="accent1">
-                <a:shade val="50000"/>
-              </a:schemeClr>
-            </a:lnRef>
-            <a:fillRef idx="1">
-              <a:schemeClr val="accent1"/>
-            </a:fillRef>
-            <a:effectRef idx="0">
-              <a:schemeClr val="accent1"/>
-            </a:effectRef>
-            <a:fontRef idx="minor">
-              <a:schemeClr val="lt1"/>
-            </a:fontRef>
-          </p:style>
-          <p:txBody>
-            <a:bodyPr rtlCol="0" anchor="ctr"/>
-            <a:lstStyle/>
-            <a:p>
-              <a:pPr algn="ctr"/>
-              <a:r>
-                <a:rPr lang="en-US" smtClean="0"/>
-                <a:t>O.S.</a:t>
-              </a:r>
-              <a:endParaRPr lang="en-US"/>
-            </a:p>
-          </p:txBody>
-        </p:sp>
-        <p:sp>
-          <p:nvSpPr>
-            <p:cNvPr id="26" name="Rounded Rectangle 25"/>
-            <p:cNvSpPr/>
-            <p:nvPr/>
-          </p:nvSpPr>
-          <p:spPr>
-            <a:xfrm>
-              <a:off x="5969919" y="5529792"/>
-              <a:ext cx="1697380" cy="882814"/>
+              <a:off x="9685221" y="2445755"/>
+              <a:ext cx="1775013" cy="1996069"/>
             </a:xfrm>
             <a:prstGeom prst="roundRect">
               <a:avLst/>
             </a:prstGeom>
             <a:solidFill>
               <a:schemeClr val="accent3">
-                <a:lumMod val="20000"/>
-                <a:lumOff val="80000"/>
+                <a:lumMod val="40000"/>
+                <a:lumOff val="60000"/>
               </a:schemeClr>
             </a:solidFill>
-            <a:ln>
+            <a:ln w="25400">
               <a:solidFill>
                 <a:schemeClr val="tx1"/>
               </a:solidFill>
@@ -3484,40 +3680,66 @@
               <a:r>
                 <a:rPr lang="en-US" dirty="0" smtClean="0">
                   <a:solidFill>
-                    <a:sysClr val="windowText" lastClr="000000"/>
+                    <a:schemeClr val="tx1"/>
                   </a:solidFill>
                 </a:rPr>
                 <a:t>OMS</a:t>
               </a:r>
               <a:endParaRPr lang="en-US" dirty="0">
                 <a:solidFill>
-                  <a:sysClr val="windowText" lastClr="000000"/>
+                  <a:schemeClr val="tx1"/>
                 </a:solidFill>
               </a:endParaRPr>
+            </a:p>
+          </p:txBody>
+        </p:sp>
+        <p:sp>
+          <p:nvSpPr>
+            <p:cNvPr id="34" name="TextBox 33"/>
+            <p:cNvSpPr txBox="1"/>
+            <p:nvPr/>
+          </p:nvSpPr>
+          <p:spPr>
+            <a:xfrm>
+              <a:off x="9043639" y="2062976"/>
+              <a:ext cx="184731" cy="369332"/>
+            </a:xfrm>
+            <a:prstGeom prst="rect">
+              <a:avLst/>
+            </a:prstGeom>
+            <a:noFill/>
+          </p:spPr>
+          <p:txBody>
+            <a:bodyPr wrap="none" rtlCol="0">
+              <a:spAutoFit/>
+            </a:bodyPr>
+            <a:lstStyle/>
+            <a:p>
+              <a:endParaRPr lang="en-US" dirty="0"/>
             </a:p>
           </p:txBody>
         </p:sp>
       </p:grpSp>
       <p:cxnSp>
         <p:nvCxnSpPr>
-          <p:cNvPr id="29" name="Elbow Connector 28"/>
+          <p:cNvPr id="38" name="Elbow Connector 37"/>
           <p:cNvCxnSpPr>
-            <a:stCxn id="6" idx="3"/>
+            <a:stCxn id="14" idx="0"/>
+            <a:endCxn id="22" idx="0"/>
           </p:cNvCxnSpPr>
           <p:nvPr/>
         </p:nvCxnSpPr>
         <p:spPr>
-          <a:xfrm>
-            <a:off x="5013258" y="2023947"/>
-            <a:ext cx="618108" cy="2688243"/>
+          <a:xfrm rot="16200000" flipH="1">
+            <a:off x="6322365" y="-220948"/>
+            <a:ext cx="2917" cy="4684090"/>
           </a:xfrm>
-          <a:prstGeom prst="bentConnector2">
-            <a:avLst/>
+          <a:prstGeom prst="bentConnector3">
+            <a:avLst>
+              <a:gd name="adj1" fmla="val -26186493"/>
+            </a:avLst>
           </a:prstGeom>
-          <a:ln w="22225">
-            <a:solidFill>
-              <a:schemeClr val="tx1"/>
-            </a:solidFill>
+          <a:ln w="31750">
             <a:headEnd type="triangle"/>
             <a:tailEnd type="triangle"/>
           </a:ln>
@@ -3539,24 +3761,24 @@
       </p:cxnSp>
       <p:cxnSp>
         <p:nvCxnSpPr>
-          <p:cNvPr id="34" name="Elbow Connector 33"/>
+          <p:cNvPr id="41" name="Elbow Connector 40"/>
           <p:cNvCxnSpPr>
-            <a:stCxn id="12" idx="1"/>
+            <a:stCxn id="9" idx="0"/>
+            <a:endCxn id="22" idx="0"/>
           </p:cNvCxnSpPr>
           <p:nvPr/>
         </p:nvCxnSpPr>
         <p:spPr>
-          <a:xfrm rot="10800000" flipV="1">
-            <a:off x="6467707" y="2023946"/>
-            <a:ext cx="663582" cy="2688243"/>
+          <a:xfrm rot="16200000" flipH="1">
+            <a:off x="5499110" y="-1044203"/>
+            <a:ext cx="2917" cy="6330600"/>
           </a:xfrm>
-          <a:prstGeom prst="bentConnector2">
-            <a:avLst/>
+          <a:prstGeom prst="bentConnector3">
+            <a:avLst>
+              <a:gd name="adj1" fmla="val -26568735"/>
+            </a:avLst>
           </a:prstGeom>
-          <a:ln w="19050">
-            <a:solidFill>
-              <a:schemeClr val="tx1"/>
-            </a:solidFill>
+          <a:ln w="31750">
             <a:headEnd type="triangle"/>
             <a:tailEnd type="triangle"/>
           </a:ln>
@@ -3576,23 +3798,105 @@
           </a:fontRef>
         </p:style>
       </p:cxnSp>
+      <p:cxnSp>
+        <p:nvCxnSpPr>
+          <p:cNvPr id="44" name="Elbow Connector 43"/>
+          <p:cNvCxnSpPr>
+            <a:stCxn id="15" idx="0"/>
+            <a:endCxn id="22" idx="0"/>
+          </p:cNvCxnSpPr>
+          <p:nvPr/>
+        </p:nvCxnSpPr>
+        <p:spPr>
+          <a:xfrm rot="16200000" flipH="1">
+            <a:off x="7122436" y="579123"/>
+            <a:ext cx="2917" cy="3083948"/>
+          </a:xfrm>
+          <a:prstGeom prst="bentConnector3">
+            <a:avLst>
+              <a:gd name="adj1" fmla="val -26186527"/>
+            </a:avLst>
+          </a:prstGeom>
+          <a:ln w="31750">
+            <a:headEnd type="triangle"/>
+            <a:tailEnd type="triangle"/>
+          </a:ln>
+        </p:spPr>
+        <p:style>
+          <a:lnRef idx="1">
+            <a:schemeClr val="accent1"/>
+          </a:lnRef>
+          <a:fillRef idx="0">
+            <a:schemeClr val="accent1"/>
+          </a:fillRef>
+          <a:effectRef idx="0">
+            <a:schemeClr val="accent1"/>
+          </a:effectRef>
+          <a:fontRef idx="minor">
+            <a:schemeClr val="tx1"/>
+          </a:fontRef>
+        </p:style>
+      </p:cxnSp>
+      <p:sp>
+        <p:nvSpPr>
+          <p:cNvPr id="15" name="Rectangle 14"/>
+          <p:cNvSpPr/>
+          <p:nvPr/>
+        </p:nvSpPr>
+        <p:spPr>
+          <a:xfrm>
+            <a:off x="4785343" y="2119639"/>
+            <a:ext cx="1593155" cy="4044825"/>
+          </a:xfrm>
+          <a:prstGeom prst="rect">
+            <a:avLst/>
+          </a:prstGeom>
+          <a:solidFill>
+            <a:schemeClr val="bg1">
+              <a:alpha val="0"/>
+            </a:schemeClr>
+          </a:solidFill>
+          <a:ln w="31750">
+            <a:solidFill>
+              <a:schemeClr val="accent6"/>
+            </a:solidFill>
+          </a:ln>
+        </p:spPr>
+        <p:style>
+          <a:lnRef idx="2">
+            <a:schemeClr val="accent1">
+              <a:shade val="50000"/>
+            </a:schemeClr>
+          </a:lnRef>
+          <a:fillRef idx="1">
+            <a:schemeClr val="accent1"/>
+          </a:fillRef>
+          <a:effectRef idx="0">
+            <a:schemeClr val="accent1"/>
+          </a:effectRef>
+          <a:fontRef idx="minor">
+            <a:schemeClr val="lt1"/>
+          </a:fontRef>
+        </p:style>
+        <p:txBody>
+          <a:bodyPr rtlCol="0" anchor="ctr"/>
+          <a:lstStyle/>
+          <a:p>
+            <a:pPr algn="ctr"/>
+            <a:endParaRPr lang="en-US"/>
+          </a:p>
+        </p:txBody>
+      </p:sp>
     </p:spTree>
     <p:extLst>
       <p:ext uri="{BB962C8B-B14F-4D97-AF65-F5344CB8AC3E}">
-        <p14:creationId xmlns:p14="http://schemas.microsoft.com/office/powerpoint/2010/main" val="503017362"/>
+        <p14:creationId xmlns:p14="http://schemas.microsoft.com/office/powerpoint/2010/main" val="179909426"/>
       </p:ext>
     </p:extLst>
   </p:cSld>
   <p:clrMapOvr>
     <a:masterClrMapping/>
   </p:clrMapOvr>
-  <p:timing>
-    <p:tnLst>
-      <p:par>
-        <p:cTn id="1" dur="indefinite" restart="never" nodeType="tmRoot"/>
-      </p:par>
-    </p:tnLst>
-  </p:timing>
 </p:sld>
 </file>
 

</xml_diff>